<commit_message>
pushing a lot of changes
</commit_message>
<xml_diff>
--- a/report/extra_credit_presentation.pptx
+++ b/report/extra_credit_presentation.pptx
@@ -6,6 +6,8 @@
   </p:sldMasterIdLst>
   <p:sldIdLst>
     <p:sldId id="256" r:id="rId2"/>
+    <p:sldId id="257" r:id="rId3"/>
+    <p:sldId id="258" r:id="rId4"/>
   </p:sldIdLst>
   <p:sldSz cx="9144000" cy="6858000" type="screen4x3"/>
   <p:notesSz cx="6858000" cy="9144000"/>
@@ -288,7 +290,7 @@
           <a:p>
             <a:fld id="{CC883614-4664-B542-9BB9-1A8DA4BB28BA}" type="datetimeFigureOut">
               <a:rPr lang="en-US" smtClean="0"/>
-              <a:t>11/30/15</a:t>
+              <a:t>12/6/15</a:t>
             </a:fld>
             <a:endParaRPr lang="en-US"/>
           </a:p>
@@ -458,7 +460,7 @@
           <a:p>
             <a:fld id="{CC883614-4664-B542-9BB9-1A8DA4BB28BA}" type="datetimeFigureOut">
               <a:rPr lang="en-US" smtClean="0"/>
-              <a:t>11/30/15</a:t>
+              <a:t>12/6/15</a:t>
             </a:fld>
             <a:endParaRPr lang="en-US"/>
           </a:p>
@@ -638,7 +640,7 @@
           <a:p>
             <a:fld id="{CC883614-4664-B542-9BB9-1A8DA4BB28BA}" type="datetimeFigureOut">
               <a:rPr lang="en-US" smtClean="0"/>
-              <a:t>11/30/15</a:t>
+              <a:t>12/6/15</a:t>
             </a:fld>
             <a:endParaRPr lang="en-US"/>
           </a:p>
@@ -718,12 +720,69 @@
       </p:grpSpPr>
       <p:sp>
         <p:nvSpPr>
-          <p:cNvPr id="2" name="Title 1"/>
-          <p:cNvSpPr>
-            <a:spLocks noGrp="1"/>
-          </p:cNvSpPr>
-          <p:nvPr>
-            <p:ph type="title"/>
+          <p:cNvPr id="3" name="Content Placeholder 2"/>
+          <p:cNvSpPr>
+            <a:spLocks noGrp="1"/>
+          </p:cNvSpPr>
+          <p:nvPr>
+            <p:ph idx="1"/>
+          </p:nvPr>
+        </p:nvSpPr>
+        <p:spPr>
+          <a:xfrm>
+            <a:off x="151026" y="645040"/>
+            <a:ext cx="8841303" cy="5600240"/>
+          </a:xfrm>
+        </p:spPr>
+        <p:txBody>
+          <a:bodyPr/>
+          <a:lstStyle/>
+          <a:p>
+            <a:pPr lvl="0"/>
+            <a:r>
+              <a:rPr lang="en-US" smtClean="0"/>
+              <a:t>Click to edit Master text styles</a:t>
+            </a:r>
+          </a:p>
+          <a:p>
+            <a:pPr lvl="1"/>
+            <a:r>
+              <a:rPr lang="en-US" smtClean="0"/>
+              <a:t>Second level</a:t>
+            </a:r>
+          </a:p>
+          <a:p>
+            <a:pPr lvl="2"/>
+            <a:r>
+              <a:rPr lang="en-US" smtClean="0"/>
+              <a:t>Third level</a:t>
+            </a:r>
+          </a:p>
+          <a:p>
+            <a:pPr lvl="3"/>
+            <a:r>
+              <a:rPr lang="en-US" smtClean="0"/>
+              <a:t>Fourth level</a:t>
+            </a:r>
+          </a:p>
+          <a:p>
+            <a:pPr lvl="4"/>
+            <a:r>
+              <a:rPr lang="en-US" smtClean="0"/>
+              <a:t>Fifth level</a:t>
+            </a:r>
+            <a:endParaRPr lang="en-US"/>
+          </a:p>
+        </p:txBody>
+      </p:sp>
+      <p:sp>
+        <p:nvSpPr>
+          <p:cNvPr id="4" name="Date Placeholder 3"/>
+          <p:cNvSpPr>
+            <a:spLocks noGrp="1"/>
+          </p:cNvSpPr>
+          <p:nvPr>
+            <p:ph type="dt" sz="half" idx="10"/>
           </p:nvPr>
         </p:nvSpPr>
         <p:spPr/>
@@ -731,84 +790,9 @@
           <a:bodyPr/>
           <a:lstStyle/>
           <a:p>
-            <a:r>
-              <a:rPr lang="en-US" smtClean="0"/>
-              <a:t>Click to edit Master title style</a:t>
-            </a:r>
-            <a:endParaRPr lang="en-US"/>
-          </a:p>
-        </p:txBody>
-      </p:sp>
-      <p:sp>
-        <p:nvSpPr>
-          <p:cNvPr id="3" name="Content Placeholder 2"/>
-          <p:cNvSpPr>
-            <a:spLocks noGrp="1"/>
-          </p:cNvSpPr>
-          <p:nvPr>
-            <p:ph idx="1"/>
-          </p:nvPr>
-        </p:nvSpPr>
-        <p:spPr/>
-        <p:txBody>
-          <a:bodyPr/>
-          <a:lstStyle/>
-          <a:p>
-            <a:pPr lvl="0"/>
-            <a:r>
-              <a:rPr lang="en-US" smtClean="0"/>
-              <a:t>Click to edit Master text styles</a:t>
-            </a:r>
-          </a:p>
-          <a:p>
-            <a:pPr lvl="1"/>
-            <a:r>
-              <a:rPr lang="en-US" smtClean="0"/>
-              <a:t>Second level</a:t>
-            </a:r>
-          </a:p>
-          <a:p>
-            <a:pPr lvl="2"/>
-            <a:r>
-              <a:rPr lang="en-US" smtClean="0"/>
-              <a:t>Third level</a:t>
-            </a:r>
-          </a:p>
-          <a:p>
-            <a:pPr lvl="3"/>
-            <a:r>
-              <a:rPr lang="en-US" smtClean="0"/>
-              <a:t>Fourth level</a:t>
-            </a:r>
-          </a:p>
-          <a:p>
-            <a:pPr lvl="4"/>
-            <a:r>
-              <a:rPr lang="en-US" smtClean="0"/>
-              <a:t>Fifth level</a:t>
-            </a:r>
-            <a:endParaRPr lang="en-US"/>
-          </a:p>
-        </p:txBody>
-      </p:sp>
-      <p:sp>
-        <p:nvSpPr>
-          <p:cNvPr id="4" name="Date Placeholder 3"/>
-          <p:cNvSpPr>
-            <a:spLocks noGrp="1"/>
-          </p:cNvSpPr>
-          <p:nvPr>
-            <p:ph type="dt" sz="half" idx="10"/>
-          </p:nvPr>
-        </p:nvSpPr>
-        <p:spPr/>
-        <p:txBody>
-          <a:bodyPr/>
-          <a:lstStyle/>
-          <a:p>
             <a:fld id="{CC883614-4664-B542-9BB9-1A8DA4BB28BA}" type="datetimeFigureOut">
               <a:rPr lang="en-US" smtClean="0"/>
-              <a:t>11/30/15</a:t>
+              <a:t>12/6/15</a:t>
             </a:fld>
             <a:endParaRPr lang="en-US"/>
           </a:p>
@@ -853,6 +837,94 @@
               <a:t>‹#›</a:t>
             </a:fld>
             <a:endParaRPr lang="en-US"/>
+          </a:p>
+        </p:txBody>
+      </p:sp>
+      <p:sp>
+        <p:nvSpPr>
+          <p:cNvPr id="7" name="Rectangle 6"/>
+          <p:cNvSpPr/>
+          <p:nvPr userDrawn="1"/>
+        </p:nvSpPr>
+        <p:spPr>
+          <a:xfrm>
+            <a:off x="0" y="0"/>
+            <a:ext cx="9144000" cy="545806"/>
+          </a:xfrm>
+          <a:prstGeom prst="rect">
+            <a:avLst/>
+          </a:prstGeom>
+          <a:solidFill>
+            <a:schemeClr val="tx2">
+              <a:lumMod val="60000"/>
+              <a:lumOff val="40000"/>
+            </a:schemeClr>
+          </a:solidFill>
+          <a:ln>
+            <a:noFill/>
+          </a:ln>
+          <a:effectLst/>
+        </p:spPr>
+        <p:style>
+          <a:lnRef idx="1">
+            <a:schemeClr val="accent1"/>
+          </a:lnRef>
+          <a:fillRef idx="3">
+            <a:schemeClr val="accent1"/>
+          </a:fillRef>
+          <a:effectRef idx="2">
+            <a:schemeClr val="accent1"/>
+          </a:effectRef>
+          <a:fontRef idx="minor">
+            <a:schemeClr val="lt1"/>
+          </a:fontRef>
+        </p:style>
+        <p:txBody>
+          <a:bodyPr rtlCol="0" anchor="ctr"/>
+          <a:lstStyle/>
+          <a:p>
+            <a:pPr algn="ctr"/>
+            <a:endParaRPr lang="en-US" dirty="0">
+              <a:latin typeface="Open Sans Light"/>
+            </a:endParaRPr>
+          </a:p>
+        </p:txBody>
+      </p:sp>
+      <p:sp>
+        <p:nvSpPr>
+          <p:cNvPr id="2" name="Title 1"/>
+          <p:cNvSpPr>
+            <a:spLocks noGrp="1"/>
+          </p:cNvSpPr>
+          <p:nvPr>
+            <p:ph type="title"/>
+          </p:nvPr>
+        </p:nvSpPr>
+        <p:spPr>
+          <a:xfrm>
+            <a:off x="151027" y="71750"/>
+            <a:ext cx="8841303" cy="400582"/>
+          </a:xfrm>
+        </p:spPr>
+        <p:txBody>
+          <a:bodyPr>
+            <a:normAutofit/>
+          </a:bodyPr>
+          <a:lstStyle>
+            <a:lvl1pPr algn="l">
+              <a:defRPr sz="1800">
+                <a:solidFill>
+                  <a:srgbClr val="FFFFFF"/>
+                </a:solidFill>
+              </a:defRPr>
+            </a:lvl1pPr>
+          </a:lstStyle>
+          <a:p>
+            <a:r>
+              <a:rPr lang="en-US" dirty="0" smtClean="0"/>
+              <a:t>Click to edit Master title style</a:t>
+            </a:r>
+            <a:endParaRPr lang="en-US" dirty="0"/>
           </a:p>
         </p:txBody>
       </p:sp>
@@ -1054,7 +1126,7 @@
           <a:p>
             <a:fld id="{CC883614-4664-B542-9BB9-1A8DA4BB28BA}" type="datetimeFigureOut">
               <a:rPr lang="en-US" smtClean="0"/>
-              <a:t>11/30/15</a:t>
+              <a:t>12/6/15</a:t>
             </a:fld>
             <a:endParaRPr lang="en-US"/>
           </a:p>
@@ -1342,7 +1414,7 @@
           <a:p>
             <a:fld id="{CC883614-4664-B542-9BB9-1A8DA4BB28BA}" type="datetimeFigureOut">
               <a:rPr lang="en-US" smtClean="0"/>
-              <a:t>11/30/15</a:t>
+              <a:t>12/6/15</a:t>
             </a:fld>
             <a:endParaRPr lang="en-US"/>
           </a:p>
@@ -1764,7 +1836,7 @@
           <a:p>
             <a:fld id="{CC883614-4664-B542-9BB9-1A8DA4BB28BA}" type="datetimeFigureOut">
               <a:rPr lang="en-US" smtClean="0"/>
-              <a:t>11/30/15</a:t>
+              <a:t>12/6/15</a:t>
             </a:fld>
             <a:endParaRPr lang="en-US"/>
           </a:p>
@@ -1882,7 +1954,7 @@
           <a:p>
             <a:fld id="{CC883614-4664-B542-9BB9-1A8DA4BB28BA}" type="datetimeFigureOut">
               <a:rPr lang="en-US" smtClean="0"/>
-              <a:t>11/30/15</a:t>
+              <a:t>12/6/15</a:t>
             </a:fld>
             <a:endParaRPr lang="en-US"/>
           </a:p>
@@ -1977,7 +2049,7 @@
           <a:p>
             <a:fld id="{CC883614-4664-B542-9BB9-1A8DA4BB28BA}" type="datetimeFigureOut">
               <a:rPr lang="en-US" smtClean="0"/>
-              <a:t>11/30/15</a:t>
+              <a:t>12/6/15</a:t>
             </a:fld>
             <a:endParaRPr lang="en-US"/>
           </a:p>
@@ -2254,7 +2326,7 @@
           <a:p>
             <a:fld id="{CC883614-4664-B542-9BB9-1A8DA4BB28BA}" type="datetimeFigureOut">
               <a:rPr lang="en-US" smtClean="0"/>
-              <a:t>11/30/15</a:t>
+              <a:t>12/6/15</a:t>
             </a:fld>
             <a:endParaRPr lang="en-US"/>
           </a:p>
@@ -2507,7 +2579,7 @@
           <a:p>
             <a:fld id="{CC883614-4664-B542-9BB9-1A8DA4BB28BA}" type="datetimeFigureOut">
               <a:rPr lang="en-US" smtClean="0"/>
-              <a:t>11/30/15</a:t>
+              <a:t>12/6/15</a:t>
             </a:fld>
             <a:endParaRPr lang="en-US"/>
           </a:p>
@@ -2616,10 +2688,10 @@
           <a:lstStyle/>
           <a:p>
             <a:r>
-              <a:rPr lang="en-US" smtClean="0"/>
+              <a:rPr lang="en-US" dirty="0" smtClean="0"/>
               <a:t>Click to edit Master title style</a:t>
             </a:r>
-            <a:endParaRPr lang="en-US"/>
+            <a:endParaRPr lang="en-US" dirty="0"/>
           </a:p>
         </p:txBody>
       </p:sp>
@@ -2650,38 +2722,38 @@
           <a:p>
             <a:pPr lvl="0"/>
             <a:r>
-              <a:rPr lang="en-US" smtClean="0"/>
+              <a:rPr lang="en-US" dirty="0" smtClean="0"/>
               <a:t>Click to edit Master text styles</a:t>
             </a:r>
           </a:p>
           <a:p>
             <a:pPr lvl="1"/>
             <a:r>
-              <a:rPr lang="en-US" smtClean="0"/>
+              <a:rPr lang="en-US" dirty="0" smtClean="0"/>
               <a:t>Second level</a:t>
             </a:r>
           </a:p>
           <a:p>
             <a:pPr lvl="2"/>
             <a:r>
-              <a:rPr lang="en-US" smtClean="0"/>
+              <a:rPr lang="en-US" dirty="0" smtClean="0"/>
               <a:t>Third level</a:t>
             </a:r>
           </a:p>
           <a:p>
             <a:pPr lvl="3"/>
             <a:r>
-              <a:rPr lang="en-US" smtClean="0"/>
+              <a:rPr lang="en-US" dirty="0" smtClean="0"/>
               <a:t>Fourth level</a:t>
             </a:r>
           </a:p>
           <a:p>
             <a:pPr lvl="4"/>
             <a:r>
-              <a:rPr lang="en-US" smtClean="0"/>
+              <a:rPr lang="en-US" dirty="0" smtClean="0"/>
               <a:t>Fifth level</a:t>
             </a:r>
-            <a:endParaRPr lang="en-US"/>
+            <a:endParaRPr lang="en-US" dirty="0"/>
           </a:p>
         </p:txBody>
       </p:sp>
@@ -2714,15 +2786,17 @@
                     <a:tint val="75000"/>
                   </a:schemeClr>
                 </a:solidFill>
+                <a:latin typeface="Open Sans Light"/>
               </a:defRPr>
             </a:lvl1pPr>
           </a:lstStyle>
           <a:p>
             <a:fld id="{CC883614-4664-B542-9BB9-1A8DA4BB28BA}" type="datetimeFigureOut">
               <a:rPr lang="en-US" smtClean="0"/>
-              <a:t>11/30/15</a:t>
+              <a:pPr/>
+              <a:t>12/6/15</a:t>
             </a:fld>
-            <a:endParaRPr lang="en-US"/>
+            <a:endParaRPr lang="en-US" dirty="0"/>
           </a:p>
         </p:txBody>
       </p:sp>
@@ -2755,11 +2829,12 @@
                     <a:tint val="75000"/>
                   </a:schemeClr>
                 </a:solidFill>
+                <a:latin typeface="Open Sans Light"/>
               </a:defRPr>
             </a:lvl1pPr>
           </a:lstStyle>
           <a:p>
-            <a:endParaRPr lang="en-US"/>
+            <a:endParaRPr lang="en-US" dirty="0"/>
           </a:p>
         </p:txBody>
       </p:sp>
@@ -2792,15 +2867,17 @@
                     <a:tint val="75000"/>
                   </a:schemeClr>
                 </a:solidFill>
+                <a:latin typeface="Open Sans Light"/>
               </a:defRPr>
             </a:lvl1pPr>
           </a:lstStyle>
           <a:p>
             <a:fld id="{199C7956-E475-4846-89F5-64C2B814DE9D}" type="slidenum">
               <a:rPr lang="en-US" smtClean="0"/>
+              <a:pPr/>
               <a:t>‹#›</a:t>
             </a:fld>
-            <a:endParaRPr lang="en-US"/>
+            <a:endParaRPr lang="en-US" dirty="0"/>
           </a:p>
         </p:txBody>
       </p:sp>
@@ -2836,9 +2913,9 @@
           <a:solidFill>
             <a:schemeClr val="tx1"/>
           </a:solidFill>
-          <a:latin typeface="+mj-lt"/>
+          <a:latin typeface="Open Sans Light"/>
           <a:ea typeface="+mj-ea"/>
-          <a:cs typeface="+mj-cs"/>
+          <a:cs typeface="Open Sans Light"/>
         </a:defRPr>
       </a:lvl1pPr>
     </p:titleStyle>
@@ -2853,9 +2930,9 @@
           <a:solidFill>
             <a:schemeClr val="tx1"/>
           </a:solidFill>
-          <a:latin typeface="+mn-lt"/>
+          <a:latin typeface="Open Sans Light"/>
           <a:ea typeface="+mn-ea"/>
-          <a:cs typeface="+mn-cs"/>
+          <a:cs typeface="Open Sans Light"/>
         </a:defRPr>
       </a:lvl1pPr>
       <a:lvl2pPr marL="742950" indent="-285750" algn="l" defTabSz="457200" rtl="0" eaLnBrk="1" latinLnBrk="0" hangingPunct="1">
@@ -2868,9 +2945,9 @@
           <a:solidFill>
             <a:schemeClr val="tx1"/>
           </a:solidFill>
-          <a:latin typeface="+mn-lt"/>
+          <a:latin typeface="Open Sans Light"/>
           <a:ea typeface="+mn-ea"/>
-          <a:cs typeface="+mn-cs"/>
+          <a:cs typeface="Open Sans Light"/>
         </a:defRPr>
       </a:lvl2pPr>
       <a:lvl3pPr marL="1143000" indent="-228600" algn="l" defTabSz="457200" rtl="0" eaLnBrk="1" latinLnBrk="0" hangingPunct="1">
@@ -2883,9 +2960,9 @@
           <a:solidFill>
             <a:schemeClr val="tx1"/>
           </a:solidFill>
-          <a:latin typeface="+mn-lt"/>
+          <a:latin typeface="Open Sans Light"/>
           <a:ea typeface="+mn-ea"/>
-          <a:cs typeface="+mn-cs"/>
+          <a:cs typeface="Open Sans Light"/>
         </a:defRPr>
       </a:lvl3pPr>
       <a:lvl4pPr marL="1600200" indent="-228600" algn="l" defTabSz="457200" rtl="0" eaLnBrk="1" latinLnBrk="0" hangingPunct="1">
@@ -2898,9 +2975,9 @@
           <a:solidFill>
             <a:schemeClr val="tx1"/>
           </a:solidFill>
-          <a:latin typeface="+mn-lt"/>
+          <a:latin typeface="Open Sans Light"/>
           <a:ea typeface="+mn-ea"/>
-          <a:cs typeface="+mn-cs"/>
+          <a:cs typeface="Open Sans Light"/>
         </a:defRPr>
       </a:lvl4pPr>
       <a:lvl5pPr marL="2057400" indent="-228600" algn="l" defTabSz="457200" rtl="0" eaLnBrk="1" latinLnBrk="0" hangingPunct="1">
@@ -2913,9 +2990,9 @@
           <a:solidFill>
             <a:schemeClr val="tx1"/>
           </a:solidFill>
-          <a:latin typeface="+mn-lt"/>
+          <a:latin typeface="Open Sans Light"/>
           <a:ea typeface="+mn-ea"/>
-          <a:cs typeface="+mn-cs"/>
+          <a:cs typeface="Open Sans Light"/>
         </a:defRPr>
       </a:lvl5pPr>
       <a:lvl6pPr marL="2514600" indent="-228600" algn="l" defTabSz="457200" rtl="0" eaLnBrk="1" latinLnBrk="0" hangingPunct="1">
@@ -3097,6 +3174,61 @@
       </p:grpSpPr>
       <p:sp>
         <p:nvSpPr>
+          <p:cNvPr id="4" name="Rectangle 3"/>
+          <p:cNvSpPr/>
+          <p:nvPr/>
+        </p:nvSpPr>
+        <p:spPr>
+          <a:xfrm>
+            <a:off x="0" y="0"/>
+            <a:ext cx="9144000" cy="6858000"/>
+          </a:xfrm>
+          <a:prstGeom prst="rect">
+            <a:avLst/>
+          </a:prstGeom>
+          <a:solidFill>
+            <a:schemeClr val="tx2">
+              <a:lumMod val="60000"/>
+              <a:lumOff val="40000"/>
+            </a:schemeClr>
+          </a:solidFill>
+          <a:ln>
+            <a:noFill/>
+          </a:ln>
+          <a:effectLst/>
+        </p:spPr>
+        <p:style>
+          <a:lnRef idx="1">
+            <a:schemeClr val="accent1"/>
+          </a:lnRef>
+          <a:fillRef idx="3">
+            <a:schemeClr val="accent1"/>
+          </a:fillRef>
+          <a:effectRef idx="2">
+            <a:schemeClr val="accent1"/>
+          </a:effectRef>
+          <a:fontRef idx="minor">
+            <a:schemeClr val="lt1"/>
+          </a:fontRef>
+        </p:style>
+        <p:txBody>
+          <a:bodyPr rot="0" spcFirstLastPara="0" vertOverflow="overflow" horzOverflow="overflow" vert="horz" wrap="square" lIns="91440" tIns="45720" rIns="91440" bIns="45720" numCol="1" spcCol="0" rtlCol="0" fromWordArt="0" anchor="ctr" anchorCtr="0" forceAA="0" compatLnSpc="1">
+            <a:prstTxWarp prst="textNoShape">
+              <a:avLst/>
+            </a:prstTxWarp>
+            <a:noAutofit/>
+          </a:bodyPr>
+          <a:lstStyle/>
+          <a:p>
+            <a:pPr algn="ctr"/>
+            <a:endParaRPr lang="en-US" dirty="0">
+              <a:latin typeface="Open Sans Light"/>
+            </a:endParaRPr>
+          </a:p>
+        </p:txBody>
+      </p:sp>
+      <p:sp>
+        <p:nvSpPr>
           <p:cNvPr id="2" name="Title 1"/>
           <p:cNvSpPr>
             <a:spLocks noGrp="1"/>
@@ -3105,12 +3237,29 @@
             <p:ph type="ctrTitle"/>
           </p:nvPr>
         </p:nvSpPr>
-        <p:spPr/>
-        <p:txBody>
-          <a:bodyPr/>
-          <a:lstStyle/>
-          <a:p>
-            <a:endParaRPr lang="en-US"/>
+        <p:spPr>
+          <a:xfrm>
+            <a:off x="685800" y="655427"/>
+            <a:ext cx="7772400" cy="1044837"/>
+          </a:xfrm>
+        </p:spPr>
+        <p:txBody>
+          <a:bodyPr/>
+          <a:lstStyle/>
+          <a:p>
+            <a:r>
+              <a:rPr lang="en-US" dirty="0" smtClean="0">
+                <a:solidFill>
+                  <a:schemeClr val="bg1"/>
+                </a:solidFill>
+              </a:rPr>
+              <a:t>Statistics 133 Final Project</a:t>
+            </a:r>
+            <a:endParaRPr lang="en-US" dirty="0">
+              <a:solidFill>
+                <a:schemeClr val="bg1"/>
+              </a:solidFill>
+            </a:endParaRPr>
           </a:p>
         </p:txBody>
       </p:sp>
@@ -3124,19 +3273,557 @@
             <p:ph type="subTitle" idx="1"/>
           </p:nvPr>
         </p:nvSpPr>
-        <p:spPr/>
-        <p:txBody>
-          <a:bodyPr/>
-          <a:lstStyle/>
-          <a:p>
-            <a:endParaRPr lang="en-US"/>
-          </a:p>
-        </p:txBody>
-      </p:sp>
+        <p:spPr>
+          <a:xfrm>
+            <a:off x="1371600" y="1711604"/>
+            <a:ext cx="6400800" cy="547827"/>
+          </a:xfrm>
+        </p:spPr>
+        <p:txBody>
+          <a:bodyPr>
+            <a:normAutofit lnSpcReduction="10000"/>
+          </a:bodyPr>
+          <a:lstStyle/>
+          <a:p>
+            <a:r>
+              <a:rPr lang="en-US" i="1" dirty="0" smtClean="0">
+                <a:solidFill>
+                  <a:srgbClr val="FFFFFF"/>
+                </a:solidFill>
+              </a:rPr>
+              <a:t>Extra Credit Presentation</a:t>
+            </a:r>
+          </a:p>
+        </p:txBody>
+      </p:sp>
+      <p:sp>
+        <p:nvSpPr>
+          <p:cNvPr id="5" name="TextBox 4"/>
+          <p:cNvSpPr txBox="1"/>
+          <p:nvPr/>
+        </p:nvSpPr>
+        <p:spPr>
+          <a:xfrm>
+            <a:off x="518635" y="5777151"/>
+            <a:ext cx="1705930" cy="769441"/>
+          </a:xfrm>
+          <a:prstGeom prst="rect">
+            <a:avLst/>
+          </a:prstGeom>
+          <a:noFill/>
+        </p:spPr>
+        <p:txBody>
+          <a:bodyPr wrap="square" rtlCol="0">
+            <a:spAutoFit/>
+          </a:bodyPr>
+          <a:lstStyle/>
+          <a:p>
+            <a:pPr algn="ctr"/>
+            <a:r>
+              <a:rPr lang="en-US" sz="1600" dirty="0" smtClean="0">
+                <a:solidFill>
+                  <a:srgbClr val="FFFFFF"/>
+                </a:solidFill>
+                <a:latin typeface="Open Sans Light"/>
+                <a:cs typeface="Open Sans Light"/>
+              </a:rPr>
+              <a:t>Christian </a:t>
+            </a:r>
+            <a:r>
+              <a:rPr lang="en-US" sz="1600" dirty="0" err="1" smtClean="0">
+                <a:solidFill>
+                  <a:srgbClr val="FFFFFF"/>
+                </a:solidFill>
+                <a:latin typeface="Open Sans Light"/>
+                <a:cs typeface="Open Sans Light"/>
+              </a:rPr>
+              <a:t>Alarcio</a:t>
+            </a:r>
+            <a:endParaRPr lang="en-US" sz="1600" dirty="0" smtClean="0">
+              <a:solidFill>
+                <a:srgbClr val="FFFFFF"/>
+              </a:solidFill>
+              <a:latin typeface="Open Sans Light"/>
+              <a:cs typeface="Open Sans Light"/>
+            </a:endParaRPr>
+          </a:p>
+          <a:p>
+            <a:pPr algn="ctr"/>
+            <a:r>
+              <a:rPr lang="en-US" sz="1400" i="1" dirty="0" smtClean="0">
+                <a:solidFill>
+                  <a:srgbClr val="FFFFFF"/>
+                </a:solidFill>
+                <a:latin typeface="Open Sans Light"/>
+              </a:rPr>
+              <a:t>Economics</a:t>
+            </a:r>
+          </a:p>
+          <a:p>
+            <a:pPr algn="ctr"/>
+            <a:r>
+              <a:rPr lang="en-US" sz="1400" i="1" dirty="0" smtClean="0">
+                <a:solidFill>
+                  <a:srgbClr val="FFFFFF"/>
+                </a:solidFill>
+                <a:latin typeface="Open Sans Light"/>
+              </a:rPr>
+              <a:t>2016</a:t>
+            </a:r>
+            <a:endParaRPr lang="en-US" sz="1400" i="1" dirty="0">
+              <a:solidFill>
+                <a:srgbClr val="FFFFFF"/>
+              </a:solidFill>
+              <a:latin typeface="Open Sans Light"/>
+            </a:endParaRPr>
+          </a:p>
+        </p:txBody>
+      </p:sp>
+      <p:sp>
+        <p:nvSpPr>
+          <p:cNvPr id="6" name="TextBox 5"/>
+          <p:cNvSpPr txBox="1"/>
+          <p:nvPr/>
+        </p:nvSpPr>
+        <p:spPr>
+          <a:xfrm>
+            <a:off x="2722989" y="5777151"/>
+            <a:ext cx="1147341" cy="769441"/>
+          </a:xfrm>
+          <a:prstGeom prst="rect">
+            <a:avLst/>
+          </a:prstGeom>
+          <a:noFill/>
+        </p:spPr>
+        <p:txBody>
+          <a:bodyPr wrap="square" rtlCol="0">
+            <a:spAutoFit/>
+          </a:bodyPr>
+          <a:lstStyle/>
+          <a:p>
+            <a:pPr algn="ctr"/>
+            <a:r>
+              <a:rPr lang="en-US" sz="1600" dirty="0" smtClean="0">
+                <a:solidFill>
+                  <a:srgbClr val="FFFFFF"/>
+                </a:solidFill>
+                <a:latin typeface="Open Sans Light"/>
+                <a:cs typeface="Open Sans Light"/>
+              </a:rPr>
+              <a:t>Ellen Chan</a:t>
+            </a:r>
+          </a:p>
+          <a:p>
+            <a:pPr algn="ctr"/>
+            <a:r>
+              <a:rPr lang="en-US" sz="1400" i="1" dirty="0" smtClean="0">
+                <a:solidFill>
+                  <a:srgbClr val="FFFFFF"/>
+                </a:solidFill>
+                <a:latin typeface="Open Sans Light"/>
+              </a:rPr>
+              <a:t>Statistics</a:t>
+            </a:r>
+          </a:p>
+          <a:p>
+            <a:pPr algn="ctr"/>
+            <a:r>
+              <a:rPr lang="en-US" sz="1400" i="1" dirty="0" smtClean="0">
+                <a:solidFill>
+                  <a:srgbClr val="FFFFFF"/>
+                </a:solidFill>
+                <a:latin typeface="Open Sans Light"/>
+              </a:rPr>
+              <a:t>2017</a:t>
+            </a:r>
+            <a:endParaRPr lang="en-US" sz="1400" i="1" dirty="0">
+              <a:solidFill>
+                <a:srgbClr val="FFFFFF"/>
+              </a:solidFill>
+              <a:latin typeface="Open Sans Light"/>
+            </a:endParaRPr>
+          </a:p>
+        </p:txBody>
+      </p:sp>
+      <p:sp>
+        <p:nvSpPr>
+          <p:cNvPr id="7" name="TextBox 6"/>
+          <p:cNvSpPr txBox="1"/>
+          <p:nvPr/>
+        </p:nvSpPr>
+        <p:spPr>
+          <a:xfrm>
+            <a:off x="4368754" y="5777151"/>
+            <a:ext cx="1260974" cy="769441"/>
+          </a:xfrm>
+          <a:prstGeom prst="rect">
+            <a:avLst/>
+          </a:prstGeom>
+          <a:noFill/>
+        </p:spPr>
+        <p:txBody>
+          <a:bodyPr wrap="square" rtlCol="0">
+            <a:spAutoFit/>
+          </a:bodyPr>
+          <a:lstStyle/>
+          <a:p>
+            <a:pPr algn="ctr"/>
+            <a:r>
+              <a:rPr lang="en-US" sz="1600" dirty="0" err="1" smtClean="0">
+                <a:solidFill>
+                  <a:srgbClr val="FFFFFF"/>
+                </a:solidFill>
+                <a:latin typeface="Open Sans Light"/>
+                <a:cs typeface="Open Sans Light"/>
+              </a:rPr>
+              <a:t>Anais</a:t>
+            </a:r>
+            <a:r>
+              <a:rPr lang="en-US" sz="1600" dirty="0" smtClean="0">
+                <a:solidFill>
+                  <a:srgbClr val="FFFFFF"/>
+                </a:solidFill>
+                <a:latin typeface="Open Sans Light"/>
+                <a:cs typeface="Open Sans Light"/>
+              </a:rPr>
+              <a:t> </a:t>
+            </a:r>
+            <a:r>
+              <a:rPr lang="en-US" sz="1600" dirty="0" err="1" smtClean="0">
+                <a:solidFill>
+                  <a:srgbClr val="FFFFFF"/>
+                </a:solidFill>
+                <a:latin typeface="Open Sans Light"/>
+                <a:cs typeface="Open Sans Light"/>
+              </a:rPr>
+              <a:t>Sidhu</a:t>
+            </a:r>
+            <a:endParaRPr lang="en-US" sz="1600" dirty="0" smtClean="0">
+              <a:solidFill>
+                <a:srgbClr val="FFFFFF"/>
+              </a:solidFill>
+              <a:latin typeface="Open Sans Light"/>
+              <a:cs typeface="Open Sans Light"/>
+            </a:endParaRPr>
+          </a:p>
+          <a:p>
+            <a:pPr algn="ctr"/>
+            <a:r>
+              <a:rPr lang="en-US" sz="1400" i="1" dirty="0" smtClean="0">
+                <a:solidFill>
+                  <a:srgbClr val="FFFFFF"/>
+                </a:solidFill>
+                <a:latin typeface="Open Sans Light"/>
+              </a:rPr>
+              <a:t>Economics</a:t>
+            </a:r>
+          </a:p>
+          <a:p>
+            <a:pPr algn="ctr"/>
+            <a:r>
+              <a:rPr lang="en-US" sz="1400" i="1" dirty="0" smtClean="0">
+                <a:solidFill>
+                  <a:srgbClr val="FFFFFF"/>
+                </a:solidFill>
+                <a:latin typeface="Open Sans Light"/>
+              </a:rPr>
+              <a:t>2017</a:t>
+            </a:r>
+            <a:endParaRPr lang="en-US" sz="1400" i="1" dirty="0">
+              <a:solidFill>
+                <a:srgbClr val="FFFFFF"/>
+              </a:solidFill>
+              <a:latin typeface="Open Sans Light"/>
+            </a:endParaRPr>
+          </a:p>
+        </p:txBody>
+      </p:sp>
+      <p:sp>
+        <p:nvSpPr>
+          <p:cNvPr id="8" name="TextBox 7"/>
+          <p:cNvSpPr txBox="1"/>
+          <p:nvPr/>
+        </p:nvSpPr>
+        <p:spPr>
+          <a:xfrm>
+            <a:off x="6128153" y="5777151"/>
+            <a:ext cx="2472041" cy="769441"/>
+          </a:xfrm>
+          <a:prstGeom prst="rect">
+            <a:avLst/>
+          </a:prstGeom>
+          <a:noFill/>
+        </p:spPr>
+        <p:txBody>
+          <a:bodyPr wrap="square" rtlCol="0">
+            <a:spAutoFit/>
+          </a:bodyPr>
+          <a:lstStyle/>
+          <a:p>
+            <a:pPr algn="ctr"/>
+            <a:r>
+              <a:rPr lang="en-US" sz="1600" dirty="0" smtClean="0">
+                <a:solidFill>
+                  <a:srgbClr val="FFFFFF"/>
+                </a:solidFill>
+                <a:latin typeface="Open Sans Light"/>
+                <a:cs typeface="Open Sans Light"/>
+              </a:rPr>
+              <a:t>Ruomeng (Michelle) Yang</a:t>
+            </a:r>
+          </a:p>
+          <a:p>
+            <a:pPr algn="ctr"/>
+            <a:r>
+              <a:rPr lang="en-US" sz="1400" i="1" dirty="0" smtClean="0">
+                <a:solidFill>
+                  <a:srgbClr val="FFFFFF"/>
+                </a:solidFill>
+                <a:latin typeface="Open Sans Light"/>
+              </a:rPr>
+              <a:t>EECS</a:t>
+            </a:r>
+          </a:p>
+          <a:p>
+            <a:pPr algn="ctr"/>
+            <a:r>
+              <a:rPr lang="en-US" sz="1400" i="1" dirty="0" smtClean="0">
+                <a:solidFill>
+                  <a:srgbClr val="FFFFFF"/>
+                </a:solidFill>
+                <a:latin typeface="Open Sans Light"/>
+              </a:rPr>
+              <a:t>2018</a:t>
+            </a:r>
+            <a:endParaRPr lang="en-US" sz="1400" i="1" dirty="0">
+              <a:solidFill>
+                <a:srgbClr val="FFFFFF"/>
+              </a:solidFill>
+              <a:latin typeface="Open Sans Light"/>
+            </a:endParaRPr>
+          </a:p>
+        </p:txBody>
+      </p:sp>
+      <p:pic>
+        <p:nvPicPr>
+          <p:cNvPr id="11" name="Picture 10"/>
+          <p:cNvPicPr>
+            <a:picLocks noChangeAspect="1"/>
+          </p:cNvPicPr>
+          <p:nvPr/>
+        </p:nvPicPr>
+        <p:blipFill>
+          <a:blip r:embed="rId2">
+            <a:alphaModFix amt="37000"/>
+          </a:blip>
+          <a:stretch>
+            <a:fillRect/>
+          </a:stretch>
+        </p:blipFill>
+        <p:spPr>
+          <a:xfrm>
+            <a:off x="0" y="2449489"/>
+            <a:ext cx="9144000" cy="3199631"/>
+          </a:xfrm>
+          <a:prstGeom prst="rect">
+            <a:avLst/>
+          </a:prstGeom>
+        </p:spPr>
+      </p:pic>
     </p:spTree>
     <p:extLst>
       <p:ext uri="{BB962C8B-B14F-4D97-AF65-F5344CB8AC3E}">
         <p14:creationId xmlns:p14="http://schemas.microsoft.com/office/powerpoint/2010/main" val="1509515641"/>
+      </p:ext>
+    </p:extLst>
+  </p:cSld>
+  <p:clrMapOvr>
+    <a:masterClrMapping/>
+  </p:clrMapOvr>
+  <p:timing>
+    <p:tnLst>
+      <p:par>
+        <p:cTn xmlns:p14="http://schemas.microsoft.com/office/powerpoint/2010/main" id="1" dur="indefinite" restart="never" nodeType="tmRoot"/>
+      </p:par>
+    </p:tnLst>
+  </p:timing>
+</p:sld>
+</file>
+
+<file path=ppt/slides/slide2.xml><?xml version="1.0" encoding="utf-8"?>
+<p:sld xmlns:a="http://schemas.openxmlformats.org/drawingml/2006/main" xmlns:r="http://schemas.openxmlformats.org/officeDocument/2006/relationships" xmlns:p="http://schemas.openxmlformats.org/presentationml/2006/main">
+  <p:cSld>
+    <p:spTree>
+      <p:nvGrpSpPr>
+        <p:cNvPr id="1" name=""/>
+        <p:cNvGrpSpPr/>
+        <p:nvPr/>
+      </p:nvGrpSpPr>
+      <p:grpSpPr>
+        <a:xfrm>
+          <a:off x="0" y="0"/>
+          <a:ext cx="0" cy="0"/>
+          <a:chOff x="0" y="0"/>
+          <a:chExt cx="0" cy="0"/>
+        </a:xfrm>
+      </p:grpSpPr>
+      <p:sp>
+        <p:nvSpPr>
+          <p:cNvPr id="2" name="Title 1"/>
+          <p:cNvSpPr>
+            <a:spLocks noGrp="1"/>
+          </p:cNvSpPr>
+          <p:nvPr>
+            <p:ph type="title"/>
+          </p:nvPr>
+        </p:nvSpPr>
+        <p:spPr>
+          <a:xfrm>
+            <a:off x="151028" y="71750"/>
+            <a:ext cx="8841303" cy="405775"/>
+          </a:xfrm>
+        </p:spPr>
+        <p:txBody>
+          <a:bodyPr>
+            <a:normAutofit/>
+          </a:bodyPr>
+          <a:lstStyle/>
+          <a:p>
+            <a:pPr algn="l"/>
+            <a:r>
+              <a:rPr lang="en-US" sz="1800" dirty="0" smtClean="0">
+                <a:solidFill>
+                  <a:srgbClr val="FFFFFF"/>
+                </a:solidFill>
+              </a:rPr>
+              <a:t>RESEARCH PROBLEM</a:t>
+            </a:r>
+            <a:endParaRPr lang="en-US" sz="1800" dirty="0">
+              <a:solidFill>
+                <a:srgbClr val="FFFFFF"/>
+              </a:solidFill>
+            </a:endParaRPr>
+          </a:p>
+        </p:txBody>
+      </p:sp>
+    </p:spTree>
+    <p:extLst>
+      <p:ext uri="{BB962C8B-B14F-4D97-AF65-F5344CB8AC3E}">
+        <p14:creationId xmlns:p14="http://schemas.microsoft.com/office/powerpoint/2010/main" val="3209377447"/>
+      </p:ext>
+    </p:extLst>
+  </p:cSld>
+  <p:clrMapOvr>
+    <a:masterClrMapping/>
+  </p:clrMapOvr>
+  <p:timing>
+    <p:tnLst>
+      <p:par>
+        <p:cTn xmlns:p14="http://schemas.microsoft.com/office/powerpoint/2010/main" id="1" dur="indefinite" restart="never" nodeType="tmRoot"/>
+      </p:par>
+    </p:tnLst>
+  </p:timing>
+</p:sld>
+</file>
+
+<file path=ppt/slides/slide3.xml><?xml version="1.0" encoding="utf-8"?>
+<p:sld xmlns:a="http://schemas.openxmlformats.org/drawingml/2006/main" xmlns:r="http://schemas.openxmlformats.org/officeDocument/2006/relationships" xmlns:p="http://schemas.openxmlformats.org/presentationml/2006/main">
+  <p:cSld>
+    <p:spTree>
+      <p:nvGrpSpPr>
+        <p:cNvPr id="1" name=""/>
+        <p:cNvGrpSpPr/>
+        <p:nvPr/>
+      </p:nvGrpSpPr>
+      <p:grpSpPr>
+        <a:xfrm>
+          <a:off x="0" y="0"/>
+          <a:ext cx="0" cy="0"/>
+          <a:chOff x="0" y="0"/>
+          <a:chExt cx="0" cy="0"/>
+        </a:xfrm>
+      </p:grpSpPr>
+      <p:sp>
+        <p:nvSpPr>
+          <p:cNvPr id="2" name="Content Placeholder 1"/>
+          <p:cNvSpPr>
+            <a:spLocks noGrp="1"/>
+          </p:cNvSpPr>
+          <p:nvPr>
+            <p:ph idx="1"/>
+          </p:nvPr>
+        </p:nvSpPr>
+        <p:spPr>
+          <a:xfrm>
+            <a:off x="151026" y="670302"/>
+            <a:ext cx="8841303" cy="4525963"/>
+          </a:xfrm>
+        </p:spPr>
+        <p:txBody>
+          <a:bodyPr>
+            <a:normAutofit/>
+          </a:bodyPr>
+          <a:lstStyle/>
+          <a:p>
+            <a:r>
+              <a:rPr lang="en-US" sz="1400" dirty="0" smtClean="0"/>
+              <a:t>Front-</a:t>
+            </a:r>
+            <a:r>
+              <a:rPr lang="en-US" sz="1400" dirty="0"/>
+              <a:t>page picture: http://</a:t>
+            </a:r>
+            <a:r>
+              <a:rPr lang="en-US" sz="1400" dirty="0" err="1"/>
+              <a:t>qcfinance.in</a:t>
+            </a:r>
+            <a:r>
+              <a:rPr lang="en-US" sz="1400" dirty="0"/>
+              <a:t>/</a:t>
+            </a:r>
+            <a:r>
+              <a:rPr lang="en-US" sz="1400" dirty="0" err="1"/>
+              <a:t>wp</a:t>
+            </a:r>
+            <a:r>
+              <a:rPr lang="en-US" sz="1400" dirty="0"/>
+              <a:t>-content/uploads/2013/10/financial-</a:t>
+            </a:r>
+            <a:r>
+              <a:rPr lang="en-US" sz="1400" dirty="0" err="1"/>
+              <a:t>analysis.jpg</a:t>
+            </a:r>
+            <a:endParaRPr lang="en-US" sz="1400" dirty="0"/>
+          </a:p>
+        </p:txBody>
+      </p:sp>
+      <p:sp>
+        <p:nvSpPr>
+          <p:cNvPr id="3" name="Title 2"/>
+          <p:cNvSpPr>
+            <a:spLocks noGrp="1"/>
+          </p:cNvSpPr>
+          <p:nvPr>
+            <p:ph type="title"/>
+          </p:nvPr>
+        </p:nvSpPr>
+        <p:spPr/>
+        <p:txBody>
+          <a:bodyPr/>
+          <a:lstStyle/>
+          <a:p>
+            <a:r>
+              <a:rPr lang="en-US" dirty="0" smtClean="0"/>
+              <a:t>SOURCES</a:t>
+            </a:r>
+            <a:endParaRPr lang="en-US" dirty="0"/>
+          </a:p>
+        </p:txBody>
+      </p:sp>
+    </p:spTree>
+    <p:extLst>
+      <p:ext uri="{BB962C8B-B14F-4D97-AF65-F5344CB8AC3E}">
+        <p14:creationId xmlns:p14="http://schemas.microsoft.com/office/powerpoint/2010/main" val="2329031321"/>
       </p:ext>
     </p:extLst>
   </p:cSld>
@@ -3424,9 +4111,24 @@
   </a:themeElements>
   <a:objectDefaults>
     <a:spDef>
-      <a:spPr/>
-      <a:bodyPr/>
-      <a:lstStyle/>
+      <a:spPr>
+        <a:solidFill>
+          <a:schemeClr val="tx2">
+            <a:lumMod val="60000"/>
+            <a:lumOff val="40000"/>
+          </a:schemeClr>
+        </a:solidFill>
+        <a:ln>
+          <a:noFill/>
+        </a:ln>
+        <a:effectLst/>
+      </a:spPr>
+      <a:bodyPr rtlCol="0" anchor="ctr"/>
+      <a:lstStyle>
+        <a:defPPr algn="ctr">
+          <a:defRPr/>
+        </a:defPPr>
+      </a:lstStyle>
       <a:style>
         <a:lnRef idx="1">
           <a:schemeClr val="accent1"/>

</xml_diff>